<commit_message>
ia vs ia fonctionnel + modifs diapo
</commit_message>
<xml_diff>
--- a/ALIA_Othello.pptx
+++ b/ALIA_Othello.pptx
@@ -32,14 +32,14 @@
   <p:notesSz cx="6858000" cy="9144000"/>
   <p:embeddedFontLst>
     <p:embeddedFont>
-      <p:font typeface="Roboto" panose="02000000000000000000" pitchFamily="2" charset="0"/>
+      <p:font typeface="Roboto Condensed" panose="020B0604020202020204" charset="0"/>
       <p:regular r:id="rId22"/>
       <p:bold r:id="rId23"/>
       <p:italic r:id="rId24"/>
       <p:boldItalic r:id="rId25"/>
     </p:embeddedFont>
     <p:embeddedFont>
-      <p:font typeface="Roboto Condensed" panose="02000000000000000000" pitchFamily="2" charset="0"/>
+      <p:font typeface="Roboto" panose="020B0604020202020204" charset="0"/>
       <p:regular r:id="rId26"/>
       <p:bold r:id="rId27"/>
       <p:italic r:id="rId28"/>
@@ -36560,41 +36560,30 @@
           </a:p>
         </p:txBody>
       </p:sp>
-      <p:sp>
-        <p:nvSpPr>
-          <p:cNvPr id="2" name="TextBox 1">
-            <a:extLst>
-              <a:ext uri="{FF2B5EF4-FFF2-40B4-BE49-F238E27FC236}">
-                <a16:creationId xmlns:a16="http://schemas.microsoft.com/office/drawing/2014/main" id="{33603317-6E86-7844-A0FE-0F335AEF8DCE}"/>
-              </a:ext>
-            </a:extLst>
-          </p:cNvPr>
-          <p:cNvSpPr txBox="1"/>
+      <p:pic>
+        <p:nvPicPr>
+          <p:cNvPr id="4" name="Image 3"/>
+          <p:cNvPicPr>
+            <a:picLocks noChangeAspect="1"/>
+          </p:cNvPicPr>
           <p:nvPr/>
-        </p:nvSpPr>
+        </p:nvPicPr>
+        <p:blipFill>
+          <a:blip r:embed="rId3"/>
+          <a:stretch>
+            <a:fillRect/>
+          </a:stretch>
+        </p:blipFill>
         <p:spPr>
           <a:xfrm>
-            <a:off x="6098651" y="2202511"/>
-            <a:ext cx="2715370" cy="307777"/>
+            <a:off x="4983206" y="2202511"/>
+            <a:ext cx="3703594" cy="2285812"/>
           </a:xfrm>
           <a:prstGeom prst="rect">
             <a:avLst/>
           </a:prstGeom>
-          <a:noFill/>
         </p:spPr>
-        <p:txBody>
-          <a:bodyPr wrap="square" rtlCol="0">
-            <a:spAutoFit/>
-          </a:bodyPr>
-          <a:lstStyle/>
-          <a:p>
-            <a:r>
-              <a:rPr lang="en-FR" dirty="0"/>
-              <a:t>Insérer photo d’un état final</a:t>
-            </a:r>
-          </a:p>
-        </p:txBody>
-      </p:sp>
+      </p:pic>
     </p:spTree>
     <p:extLst>
       <p:ext uri="{BB962C8B-B14F-4D97-AF65-F5344CB8AC3E}">

</xml_diff>